<commit_message>
Bevezető c. dia tartalmi kiegészítése
</commit_message>
<xml_diff>
--- a/Autószerelő alkalmazás.pptx
+++ b/Autószerelő alkalmazás.pptx
@@ -5810,14 +5810,48 @@
             <p:ph idx="1"/>
           </p:nvPr>
         </p:nvSpPr>
-        <p:spPr/>
-        <p:txBody>
-          <a:bodyPr/>
+        <p:spPr>
+          <a:xfrm>
+            <a:off x="1295402" y="2556932"/>
+            <a:ext cx="9601196" cy="3318936"/>
+          </a:xfrm>
+        </p:spPr>
+        <p:txBody>
+          <a:bodyPr>
+            <a:normAutofit fontScale="92500" lnSpcReduction="20000"/>
+          </a:bodyPr>
           <a:lstStyle/>
           <a:p>
             <a:r>
               <a:rPr lang="hu-HU" dirty="0"/>
-              <a:t>Cégünk telephelye Debrecentől 15 km-re található, egy kisebb városban. Mivel a környéken nem található olyan autószerelő műhely, mely ilyen széleskörű szolgáltatásokat nyújt, ezért cégünk vezetése a előrelépés mellett döntött, ennek megfelelően egy gyors és hatékony számítógépes rendszer fejlesztését tervezzük. Ezen igényekre támaszkodva továbbfejlesztjük a programot mellyel jelenleg dolgozunk. A továbbfejlesztés célja, hogy hatékonyabban lehessen a jelenleginél végezni az adminisztrációt, továbbá pontosabban is.</a:t>
+              <a:t>Cégünk telephelye Debrecentől 15 km-re található, egy kisebb városban. Mivel a környéken nem található olyan autószerelő műhely, mely ilyen széleskörű szolgáltatásokat nyújt, ezért cégünk vezetése a előrelépés mellett döntött, ennek megfelelően egy gyors és hatékony számítógépes rendszer bevezetése mellett döntött. Ezen igényekre támaszkodva továbbfejlesztjük a programot mellyel jelenleg dolgozunk. A továbbfejlesztés célja, hogy munkatársaink a jelenlegi helyzetnél hatékonyabban, gyorsabban és kényelmesebben tudják végezni az adminisztrációs folyamatokat.</a:t>
+            </a:r>
+            <a:br>
+              <a:rPr lang="hu-HU" dirty="0"/>
+            </a:br>
+            <a:r>
+              <a:rPr lang="hu-HU" dirty="0"/>
+              <a:t>Mivel a project még kezdetleges állapotban van, így kollégáink visszajelzései alapján további fejlesztéseket fogunk végrehajtani, a maximális felhasználói élmény </a:t>
+            </a:r>
+            <a:r>
+              <a:rPr lang="hu-HU" dirty="0" err="1"/>
+              <a:t>maximalizálásámak</a:t>
+            </a:r>
+            <a:r>
+              <a:rPr lang="hu-HU"/>
+              <a:t>, </a:t>
+            </a:r>
+            <a:r>
+              <a:rPr lang="hu-HU" dirty="0"/>
+              <a:t>valamint a munkafolyamatok </a:t>
+            </a:r>
+            <a:r>
+              <a:rPr lang="hu-HU"/>
+              <a:t>megkönnyítésének érdekében</a:t>
+            </a:r>
+            <a:r>
+              <a:rPr lang="hu-HU" dirty="0"/>
+              <a:t>.</a:t>
             </a:r>
           </a:p>
         </p:txBody>

</xml_diff>

<commit_message>
Jel. helyzet c. dia feltöltése GitHub-ra
</commit_message>
<xml_diff>
--- a/Autószerelő alkalmazás.pptx
+++ b/Autószerelő alkalmazás.pptx
@@ -7,6 +7,7 @@
   <p:sldIdLst>
     <p:sldId id="256" r:id="rId2"/>
     <p:sldId id="257" r:id="rId3"/>
+    <p:sldId id="258" r:id="rId4"/>
   </p:sldIdLst>
   <p:sldSz cx="12192000" cy="6858000"/>
   <p:notesSz cx="6858000" cy="9144000"/>
@@ -5831,27 +5832,7 @@
             </a:br>
             <a:r>
               <a:rPr lang="hu-HU" dirty="0"/>
-              <a:t>Mivel a project még kezdetleges állapotban van, így kollégáink visszajelzései alapján további fejlesztéseket fogunk végrehajtani, a maximális felhasználói élmény </a:t>
-            </a:r>
-            <a:r>
-              <a:rPr lang="hu-HU" dirty="0" err="1"/>
-              <a:t>maximalizálásámak</a:t>
-            </a:r>
-            <a:r>
-              <a:rPr lang="hu-HU"/>
-              <a:t>, </a:t>
-            </a:r>
-            <a:r>
-              <a:rPr lang="hu-HU" dirty="0"/>
-              <a:t>valamint a munkafolyamatok </a:t>
-            </a:r>
-            <a:r>
-              <a:rPr lang="hu-HU"/>
-              <a:t>megkönnyítésének érdekében</a:t>
-            </a:r>
-            <a:r>
-              <a:rPr lang="hu-HU" dirty="0"/>
-              <a:t>.</a:t>
+              <a:t>Mivel a project még kezdetleges állapotban van, így kollégáink visszajelzései alapján további fejlesztéseket fogunk végrehajtani, a maximális felhasználói élmény maximalizálásának, valamint a munkafolyamatok megkönnyítésének érdekében.</a:t>
             </a:r>
           </a:p>
         </p:txBody>
@@ -5860,6 +5841,110 @@
     <p:extLst>
       <p:ext uri="{BB962C8B-B14F-4D97-AF65-F5344CB8AC3E}">
         <p14:creationId xmlns:p14="http://schemas.microsoft.com/office/powerpoint/2010/main" val="3449018205"/>
+      </p:ext>
+    </p:extLst>
+  </p:cSld>
+  <p:clrMapOvr>
+    <a:masterClrMapping/>
+  </p:clrMapOvr>
+</p:sld>
+</file>
+
+<file path=ppt/slides/slide3.xml><?xml version="1.0" encoding="utf-8"?>
+<p:sld xmlns:a="http://schemas.openxmlformats.org/drawingml/2006/main" xmlns:r="http://schemas.openxmlformats.org/officeDocument/2006/relationships" xmlns:p="http://schemas.openxmlformats.org/presentationml/2006/main">
+  <p:cSld>
+    <p:spTree>
+      <p:nvGrpSpPr>
+        <p:cNvPr id="1" name=""/>
+        <p:cNvGrpSpPr/>
+        <p:nvPr/>
+      </p:nvGrpSpPr>
+      <p:grpSpPr>
+        <a:xfrm>
+          <a:off x="0" y="0"/>
+          <a:ext cx="0" cy="0"/>
+          <a:chOff x="0" y="0"/>
+          <a:chExt cx="0" cy="0"/>
+        </a:xfrm>
+      </p:grpSpPr>
+      <p:sp>
+        <p:nvSpPr>
+          <p:cNvPr id="2" name="Cím 1">
+            <a:extLst>
+              <a:ext uri="{FF2B5EF4-FFF2-40B4-BE49-F238E27FC236}">
+                <a16:creationId xmlns:a16="http://schemas.microsoft.com/office/drawing/2014/main" id="{67074623-AD60-44FF-9BA7-7E8A85A35115}"/>
+              </a:ext>
+            </a:extLst>
+          </p:cNvPr>
+          <p:cNvSpPr>
+            <a:spLocks noGrp="1"/>
+          </p:cNvSpPr>
+          <p:nvPr>
+            <p:ph type="title"/>
+          </p:nvPr>
+        </p:nvSpPr>
+        <p:spPr/>
+        <p:txBody>
+          <a:bodyPr/>
+          <a:lstStyle/>
+          <a:p>
+            <a:r>
+              <a:rPr lang="hu-HU" dirty="0"/>
+              <a:t>Jelenlegi helyzet</a:t>
+            </a:r>
+          </a:p>
+        </p:txBody>
+      </p:sp>
+      <p:sp>
+        <p:nvSpPr>
+          <p:cNvPr id="3" name="Tartalom helye 2">
+            <a:extLst>
+              <a:ext uri="{FF2B5EF4-FFF2-40B4-BE49-F238E27FC236}">
+                <a16:creationId xmlns:a16="http://schemas.microsoft.com/office/drawing/2014/main" id="{A01FE099-4EFF-4F72-926F-BBE3202CB09A}"/>
+              </a:ext>
+            </a:extLst>
+          </p:cNvPr>
+          <p:cNvSpPr>
+            <a:spLocks noGrp="1"/>
+          </p:cNvSpPr>
+          <p:nvPr>
+            <p:ph idx="1"/>
+          </p:nvPr>
+        </p:nvSpPr>
+        <p:spPr/>
+        <p:txBody>
+          <a:bodyPr>
+            <a:normAutofit fontScale="92500"/>
+          </a:bodyPr>
+          <a:lstStyle/>
+          <a:p>
+            <a:r>
+              <a:rPr lang="hu-HU" dirty="0"/>
+              <a:t>Cégünk jelenleg is használt adminisztrációs rendszerét korábban az Önök </a:t>
+            </a:r>
+            <a:r>
+              <a:rPr lang="hu-HU" dirty="0" err="1"/>
+              <a:t>cége</a:t>
+            </a:r>
+            <a:r>
+              <a:rPr lang="hu-HU" dirty="0"/>
+              <a:t> készítette el számunkra. A programmal elégedettek vagyunk, azonban a gyorsan fejlődő világban, rohamosan változó piaci helyzet mellett, elkerülhetetlenné vált ezen program továbbfejlesztése is. Programunkban képesek vagyunk rögzíteni az autókat valamint a hozzájuk kapcsolódó ügyfeleket. Itt követjük nyomon a szerelések árát is. A kifizetett autókat egy hónapon belül töröljük az adatbázisból. Azt is tudni érdemes, hogy az Önök által használt alkalmazásának is vannak hiányosságai amik orvosolása nagyban megkönnyítené a jelenlegi adminisztrációs folyamatainkat</a:t>
+            </a:r>
+            <a:r>
+              <a:rPr lang="hu-HU"/>
+              <a:t>, ezért megkérjük </a:t>
+            </a:r>
+            <a:r>
+              <a:rPr lang="hu-HU" dirty="0"/>
+              <a:t>önöket az alkalmazás továbbfejlesztésére.</a:t>
+            </a:r>
+          </a:p>
+        </p:txBody>
+      </p:sp>
+    </p:spTree>
+    <p:extLst>
+      <p:ext uri="{BB962C8B-B14F-4D97-AF65-F5344CB8AC3E}">
+        <p14:creationId xmlns:p14="http://schemas.microsoft.com/office/powerpoint/2010/main" val="2205534429"/>
       </p:ext>
     </p:extLst>
   </p:cSld>

</xml_diff>

<commit_message>
Köv.lista c. dia feltöltése GitHub-ra
</commit_message>
<xml_diff>
--- a/Autószerelő alkalmazás.pptx
+++ b/Autószerelő alkalmazás.pptx
@@ -6013,7 +6013,42 @@
           <a:bodyPr/>
           <a:lstStyle/>
           <a:p>
-            <a:endParaRPr lang="hu-HU"/>
+            <a:r>
+              <a:rPr lang="hu-HU" dirty="0"/>
+              <a:t>A rendszer legyen képes az autók mellett a szerelők nyilvántartására is.</a:t>
+            </a:r>
+          </a:p>
+          <a:p>
+            <a:r>
+              <a:rPr lang="hu-HU" dirty="0"/>
+              <a:t>A rendszer legyen képes részletes adattárolásra (egy tulajdonoshoz több autót is hozzá lehessen rendelni.)</a:t>
+            </a:r>
+          </a:p>
+          <a:p>
+            <a:r>
+              <a:rPr lang="hu-HU" dirty="0"/>
+              <a:t>Legyünk </a:t>
+            </a:r>
+            <a:r>
+              <a:rPr lang="hu-HU"/>
+              <a:t>képesek külön-külön </a:t>
+            </a:r>
+            <a:r>
+              <a:rPr lang="hu-HU" dirty="0"/>
+              <a:t>szerkeszteni az ilyen jellegű autókat (melyek egy tulajdonoshoz vannak rendelve.)</a:t>
+            </a:r>
+          </a:p>
+          <a:p>
+            <a:r>
+              <a:rPr lang="hu-HU" dirty="0"/>
+              <a:t>A programunk továbbfejlesztett verziója is, egyszerű, letisztult, könnyedén kezelhető, felhasználóbarát felülettel rendelkezzen.</a:t>
+            </a:r>
+          </a:p>
+          <a:p>
+            <a:pPr marL="0" indent="0">
+              <a:buNone/>
+            </a:pPr>
+            <a:endParaRPr lang="hu-HU" dirty="0"/>
           </a:p>
         </p:txBody>
       </p:sp>

</xml_diff>

<commit_message>
negyedik dia címének megadása
</commit_message>
<xml_diff>
--- a/Autószerelő alkalmazás.pptx
+++ b/Autószerelő alkalmazás.pptx
@@ -9,6 +9,7 @@
     <p:sldId id="257" r:id="rId3"/>
     <p:sldId id="258" r:id="rId4"/>
     <p:sldId id="259" r:id="rId5"/>
+    <p:sldId id="260" r:id="rId6"/>
   </p:sldIdLst>
   <p:sldSz cx="12192000" cy="6858000"/>
   <p:notesSz cx="6858000" cy="9144000"/>
@@ -6027,15 +6028,7 @@
           <a:p>
             <a:r>
               <a:rPr lang="hu-HU" dirty="0"/>
-              <a:t>Legyünk </a:t>
-            </a:r>
-            <a:r>
-              <a:rPr lang="hu-HU"/>
-              <a:t>képesek külön-külön </a:t>
-            </a:r>
-            <a:r>
-              <a:rPr lang="hu-HU" dirty="0"/>
-              <a:t>szerkeszteni az ilyen jellegű autókat (melyek egy tulajdonoshoz vannak rendelve.)</a:t>
+              <a:t>Legyünk képesek külön-külön szerkeszteni az ilyen jellegű autókat (melyek egy tulajdonoshoz vannak rendelve.)</a:t>
             </a:r>
           </a:p>
           <a:p>
@@ -6056,6 +6049,89 @@
     <p:extLst>
       <p:ext uri="{BB962C8B-B14F-4D97-AF65-F5344CB8AC3E}">
         <p14:creationId xmlns:p14="http://schemas.microsoft.com/office/powerpoint/2010/main" val="2651361256"/>
+      </p:ext>
+    </p:extLst>
+  </p:cSld>
+  <p:clrMapOvr>
+    <a:masterClrMapping/>
+  </p:clrMapOvr>
+</p:sld>
+</file>
+
+<file path=ppt/slides/slide5.xml><?xml version="1.0" encoding="utf-8"?>
+<p:sld xmlns:a="http://schemas.openxmlformats.org/drawingml/2006/main" xmlns:r="http://schemas.openxmlformats.org/officeDocument/2006/relationships" xmlns:p="http://schemas.openxmlformats.org/presentationml/2006/main">
+  <p:cSld>
+    <p:spTree>
+      <p:nvGrpSpPr>
+        <p:cNvPr id="1" name=""/>
+        <p:cNvGrpSpPr/>
+        <p:nvPr/>
+      </p:nvGrpSpPr>
+      <p:grpSpPr>
+        <a:xfrm>
+          <a:off x="0" y="0"/>
+          <a:ext cx="0" cy="0"/>
+          <a:chOff x="0" y="0"/>
+          <a:chExt cx="0" cy="0"/>
+        </a:xfrm>
+      </p:grpSpPr>
+      <p:sp>
+        <p:nvSpPr>
+          <p:cNvPr id="2" name="Cím 1">
+            <a:extLst>
+              <a:ext uri="{FF2B5EF4-FFF2-40B4-BE49-F238E27FC236}">
+                <a16:creationId xmlns:a16="http://schemas.microsoft.com/office/drawing/2014/main" id="{4FE0F913-40B4-42CC-A1E1-EF7C903DDC28}"/>
+              </a:ext>
+            </a:extLst>
+          </p:cNvPr>
+          <p:cNvSpPr>
+            <a:spLocks noGrp="1"/>
+          </p:cNvSpPr>
+          <p:nvPr>
+            <p:ph type="title"/>
+          </p:nvPr>
+        </p:nvSpPr>
+        <p:spPr/>
+        <p:txBody>
+          <a:bodyPr/>
+          <a:lstStyle/>
+          <a:p>
+            <a:r>
+              <a:rPr lang="hu-HU" dirty="0"/>
+              <a:t>A szoftver jelenlegi helyzete</a:t>
+            </a:r>
+          </a:p>
+        </p:txBody>
+      </p:sp>
+      <p:sp>
+        <p:nvSpPr>
+          <p:cNvPr id="3" name="Tartalom helye 2">
+            <a:extLst>
+              <a:ext uri="{FF2B5EF4-FFF2-40B4-BE49-F238E27FC236}">
+                <a16:creationId xmlns:a16="http://schemas.microsoft.com/office/drawing/2014/main" id="{E4BC2112-AA44-4B9C-9EF5-889592F655C2}"/>
+              </a:ext>
+            </a:extLst>
+          </p:cNvPr>
+          <p:cNvSpPr>
+            <a:spLocks noGrp="1"/>
+          </p:cNvSpPr>
+          <p:nvPr>
+            <p:ph idx="1"/>
+          </p:nvPr>
+        </p:nvSpPr>
+        <p:spPr/>
+        <p:txBody>
+          <a:bodyPr/>
+          <a:lstStyle/>
+          <a:p>
+            <a:endParaRPr lang="hu-HU" dirty="0"/>
+          </a:p>
+        </p:txBody>
+      </p:sp>
+    </p:spTree>
+    <p:extLst>
+      <p:ext uri="{BB962C8B-B14F-4D97-AF65-F5344CB8AC3E}">
+        <p14:creationId xmlns:p14="http://schemas.microsoft.com/office/powerpoint/2010/main" val="470884550"/>
       </p:ext>
     </p:extLst>
   </p:cSld>

</xml_diff>